<commit_message>
added link to ppt
</commit_message>
<xml_diff>
--- a/Images/Creating The Contact Manager.pptx
+++ b/Images/Creating The Contact Manager.pptx
@@ -5,7 +5,7 @@
     <p:sldMasterId id="2147483648" r:id="rId1"/>
   </p:sldMasterIdLst>
   <p:notesMasterIdLst>
-    <p:notesMasterId r:id="rId11"/>
+    <p:notesMasterId r:id="rId12"/>
   </p:notesMasterIdLst>
   <p:sldIdLst>
     <p:sldId id="256" r:id="rId2"/>
@@ -16,7 +16,8 @@
     <p:sldId id="267" r:id="rId7"/>
     <p:sldId id="269" r:id="rId8"/>
     <p:sldId id="266" r:id="rId9"/>
-    <p:sldId id="262" r:id="rId10"/>
+    <p:sldId id="270" r:id="rId10"/>
+    <p:sldId id="262" r:id="rId11"/>
   </p:sldIdLst>
   <p:sldSz cx="12192000" cy="6858000"/>
   <p:notesSz cx="6858000" cy="9144000"/>
@@ -209,7 +210,7 @@
           <a:p>
             <a:fld id="{A6E595E7-8C86-4DF0-B741-F60CAF4F7D6F}" type="datetimeFigureOut">
               <a:rPr lang="en-US"/>
-              <a:t>1/29/2018</a:t>
+              <a:t>1/31/2018</a:t>
             </a:fld>
             <a:endParaRPr lang="en-US"/>
           </a:p>
@@ -521,8 +522,8 @@
           <a:lstStyle/>
           <a:p>
             <a:r>
-              <a:rPr lang="en-US"/>
-              <a:t>Lorraine or Huong</a:t>
+              <a:rPr lang="en-US" dirty="0"/>
+              <a:t>Lorraine</a:t>
             </a:r>
           </a:p>
         </p:txBody>
@@ -873,7 +874,7 @@
           <a:p>
             <a:r>
               <a:rPr lang="en-US" dirty="0"/>
-              <a:t>Lorraine or Huong</a:t>
+              <a:t>Huong</a:t>
             </a:r>
           </a:p>
         </p:txBody>
@@ -1001,6 +1002,177 @@
 </p:notes>
 </file>
 
+<file path=ppt/notesSlides/notesSlide7.xml><?xml version="1.0" encoding="utf-8"?>
+<p:notes xmlns:a="http://schemas.openxmlformats.org/drawingml/2006/main" xmlns:r="http://schemas.openxmlformats.org/officeDocument/2006/relationships" xmlns:p="http://schemas.openxmlformats.org/presentationml/2006/main">
+  <p:cSld>
+    <p:spTree>
+      <p:nvGrpSpPr>
+        <p:cNvPr id="1" name=""/>
+        <p:cNvGrpSpPr/>
+        <p:nvPr/>
+      </p:nvGrpSpPr>
+      <p:grpSpPr>
+        <a:xfrm>
+          <a:off x="0" y="0"/>
+          <a:ext cx="0" cy="0"/>
+          <a:chOff x="0" y="0"/>
+          <a:chExt cx="0" cy="0"/>
+        </a:xfrm>
+      </p:grpSpPr>
+      <p:sp>
+        <p:nvSpPr>
+          <p:cNvPr id="2" name="Slide Image Placeholder 1"/>
+          <p:cNvSpPr>
+            <a:spLocks noGrp="1" noRot="1" noChangeAspect="1"/>
+          </p:cNvSpPr>
+          <p:nvPr>
+            <p:ph type="sldImg"/>
+          </p:nvPr>
+        </p:nvSpPr>
+        <p:spPr/>
+      </p:sp>
+      <p:sp>
+        <p:nvSpPr>
+          <p:cNvPr id="3" name="Notes Placeholder 2"/>
+          <p:cNvSpPr>
+            <a:spLocks noGrp="1"/>
+          </p:cNvSpPr>
+          <p:nvPr>
+            <p:ph type="body" idx="1"/>
+          </p:nvPr>
+        </p:nvSpPr>
+        <p:spPr/>
+        <p:txBody>
+          <a:bodyPr/>
+          <a:lstStyle/>
+          <a:p>
+            <a:r>
+              <a:rPr lang="en-US" dirty="0"/>
+              <a:t>Rachael</a:t>
+            </a:r>
+          </a:p>
+        </p:txBody>
+      </p:sp>
+      <p:sp>
+        <p:nvSpPr>
+          <p:cNvPr id="4" name="Slide Number Placeholder 3"/>
+          <p:cNvSpPr>
+            <a:spLocks noGrp="1"/>
+          </p:cNvSpPr>
+          <p:nvPr>
+            <p:ph type="sldNum" sz="quarter" idx="10"/>
+          </p:nvPr>
+        </p:nvSpPr>
+        <p:spPr/>
+        <p:txBody>
+          <a:bodyPr/>
+          <a:lstStyle/>
+          <a:p>
+            <a:fld id="{4FC48653-B8FE-4C39-AE16-7E61D46866B1}" type="slidenum">
+              <a:rPr lang="en-US" smtClean="0"/>
+              <a:t>9</a:t>
+            </a:fld>
+            <a:endParaRPr lang="en-US"/>
+          </a:p>
+        </p:txBody>
+      </p:sp>
+    </p:spTree>
+    <p:extLst>
+      <p:ext uri="{BB962C8B-B14F-4D97-AF65-F5344CB8AC3E}">
+        <p14:creationId xmlns:p14="http://schemas.microsoft.com/office/powerpoint/2010/main" val="4207351396"/>
+      </p:ext>
+    </p:extLst>
+  </p:cSld>
+  <p:clrMapOvr>
+    <a:masterClrMapping/>
+  </p:clrMapOvr>
+</p:notes>
+</file>
+
+<file path=ppt/notesSlides/notesSlide8.xml><?xml version="1.0" encoding="utf-8"?>
+<p:notes xmlns:a="http://schemas.openxmlformats.org/drawingml/2006/main" xmlns:r="http://schemas.openxmlformats.org/officeDocument/2006/relationships" xmlns:p="http://schemas.openxmlformats.org/presentationml/2006/main">
+  <p:cSld>
+    <p:spTree>
+      <p:nvGrpSpPr>
+        <p:cNvPr id="1" name=""/>
+        <p:cNvGrpSpPr/>
+        <p:nvPr/>
+      </p:nvGrpSpPr>
+      <p:grpSpPr>
+        <a:xfrm>
+          <a:off x="0" y="0"/>
+          <a:ext cx="0" cy="0"/>
+          <a:chOff x="0" y="0"/>
+          <a:chExt cx="0" cy="0"/>
+        </a:xfrm>
+      </p:grpSpPr>
+      <p:sp>
+        <p:nvSpPr>
+          <p:cNvPr id="2" name="Slide Image Placeholder 1"/>
+          <p:cNvSpPr>
+            <a:spLocks noGrp="1" noRot="1" noChangeAspect="1"/>
+          </p:cNvSpPr>
+          <p:nvPr>
+            <p:ph type="sldImg"/>
+          </p:nvPr>
+        </p:nvSpPr>
+        <p:spPr/>
+      </p:sp>
+      <p:sp>
+        <p:nvSpPr>
+          <p:cNvPr id="3" name="Notes Placeholder 2"/>
+          <p:cNvSpPr>
+            <a:spLocks noGrp="1"/>
+          </p:cNvSpPr>
+          <p:nvPr>
+            <p:ph type="body" idx="1"/>
+          </p:nvPr>
+        </p:nvSpPr>
+        <p:spPr/>
+        <p:txBody>
+          <a:bodyPr/>
+          <a:lstStyle/>
+          <a:p>
+            <a:endParaRPr lang="en-US"/>
+          </a:p>
+        </p:txBody>
+      </p:sp>
+      <p:sp>
+        <p:nvSpPr>
+          <p:cNvPr id="4" name="Slide Number Placeholder 3"/>
+          <p:cNvSpPr>
+            <a:spLocks noGrp="1"/>
+          </p:cNvSpPr>
+          <p:nvPr>
+            <p:ph type="sldNum" sz="quarter" idx="10"/>
+          </p:nvPr>
+        </p:nvSpPr>
+        <p:spPr/>
+        <p:txBody>
+          <a:bodyPr/>
+          <a:lstStyle/>
+          <a:p>
+            <a:fld id="{4FC48653-B8FE-4C39-AE16-7E61D46866B1}" type="slidenum">
+              <a:rPr lang="en-US" smtClean="0"/>
+              <a:t>10</a:t>
+            </a:fld>
+            <a:endParaRPr lang="en-US"/>
+          </a:p>
+        </p:txBody>
+      </p:sp>
+    </p:spTree>
+    <p:extLst>
+      <p:ext uri="{BB962C8B-B14F-4D97-AF65-F5344CB8AC3E}">
+        <p14:creationId xmlns:p14="http://schemas.microsoft.com/office/powerpoint/2010/main" val="2275077293"/>
+      </p:ext>
+    </p:extLst>
+  </p:cSld>
+  <p:clrMapOvr>
+    <a:masterClrMapping/>
+  </p:clrMapOvr>
+</p:notes>
+</file>
+
 <file path=ppt/slideLayouts/slideLayout1.xml><?xml version="1.0" encoding="utf-8"?>
 <p:sldLayout xmlns:a="http://schemas.openxmlformats.org/drawingml/2006/main" xmlns:r="http://schemas.openxmlformats.org/officeDocument/2006/relationships" xmlns:p="http://schemas.openxmlformats.org/presentationml/2006/main" type="title" preserve="1">
   <p:cSld name="Title Slide">
@@ -1182,7 +1354,7 @@
           <a:p>
             <a:fld id="{4AAD347D-5ACD-4C99-B74B-A9C85AD731AF}" type="datetimeFigureOut">
               <a:rPr lang="en-US" dirty="0"/>
-              <a:t>1/29/2018</a:t>
+              <a:t>1/31/2018</a:t>
             </a:fld>
             <a:endParaRPr lang="en-US"/>
           </a:p>
@@ -1450,7 +1622,7 @@
           <a:p>
             <a:fld id="{4509A250-FF31-4206-8172-F9D3106AACB1}" type="datetimeFigureOut">
               <a:rPr lang="en-US" dirty="0"/>
-              <a:t>1/29/2018</a:t>
+              <a:t>1/31/2018</a:t>
             </a:fld>
             <a:endParaRPr lang="en-US"/>
           </a:p>
@@ -1638,7 +1810,7 @@
           <a:p>
             <a:fld id="{4509A250-FF31-4206-8172-F9D3106AACB1}" type="datetimeFigureOut">
               <a:rPr lang="en-US" dirty="0"/>
-              <a:t>1/29/2018</a:t>
+              <a:t>1/31/2018</a:t>
             </a:fld>
             <a:endParaRPr lang="en-US"/>
           </a:p>
@@ -1900,7 +2072,7 @@
           <a:p>
             <a:fld id="{4509A250-FF31-4206-8172-F9D3106AACB1}" type="datetimeFigureOut">
               <a:rPr lang="en-US" dirty="0"/>
-              <a:t>1/29/2018</a:t>
+              <a:t>1/31/2018</a:t>
             </a:fld>
             <a:endParaRPr lang="en-US"/>
           </a:p>
@@ -2226,7 +2398,7 @@
           <a:p>
             <a:fld id="{4509A250-FF31-4206-8172-F9D3106AACB1}" type="datetimeFigureOut">
               <a:rPr lang="en-US" dirty="0"/>
-              <a:t>1/29/2018</a:t>
+              <a:t>1/31/2018</a:t>
             </a:fld>
             <a:endParaRPr lang="en-US"/>
           </a:p>
@@ -2830,7 +3002,7 @@
           <a:p>
             <a:fld id="{4509A250-FF31-4206-8172-F9D3106AACB1}" type="datetimeFigureOut">
               <a:rPr lang="en-US" dirty="0"/>
-              <a:t>1/29/2018</a:t>
+              <a:t>1/31/2018</a:t>
             </a:fld>
             <a:endParaRPr lang="en-US"/>
           </a:p>
@@ -3668,7 +3840,7 @@
           <a:p>
             <a:fld id="{4509A250-FF31-4206-8172-F9D3106AACB1}" type="datetimeFigureOut">
               <a:rPr lang="en-US" dirty="0"/>
-              <a:t>1/29/2018</a:t>
+              <a:t>1/31/2018</a:t>
             </a:fld>
             <a:endParaRPr lang="en-US"/>
           </a:p>
@@ -3831,7 +4003,7 @@
           <a:p>
             <a:fld id="{4509A250-FF31-4206-8172-F9D3106AACB1}" type="datetimeFigureOut">
               <a:rPr lang="en-US" dirty="0"/>
-              <a:t>1/29/2018</a:t>
+              <a:t>1/31/2018</a:t>
             </a:fld>
             <a:endParaRPr lang="en-US"/>
           </a:p>
@@ -4004,7 +4176,7 @@
           <a:p>
             <a:fld id="{4509A250-FF31-4206-8172-F9D3106AACB1}" type="datetimeFigureOut">
               <a:rPr lang="en-US" dirty="0"/>
-              <a:t>1/29/2018</a:t>
+              <a:t>1/31/2018</a:t>
             </a:fld>
             <a:endParaRPr lang="en-US"/>
           </a:p>
@@ -4167,7 +4339,7 @@
           <a:p>
             <a:fld id="{4509A250-FF31-4206-8172-F9D3106AACB1}" type="datetimeFigureOut">
               <a:rPr lang="en-US" dirty="0"/>
-              <a:t>1/29/2018</a:t>
+              <a:t>1/31/2018</a:t>
             </a:fld>
             <a:endParaRPr lang="en-US"/>
           </a:p>
@@ -4405,7 +4577,7 @@
           <a:p>
             <a:fld id="{4509A250-FF31-4206-8172-F9D3106AACB1}" type="datetimeFigureOut">
               <a:rPr lang="en-US" dirty="0"/>
-              <a:t>1/29/2018</a:t>
+              <a:t>1/31/2018</a:t>
             </a:fld>
             <a:endParaRPr lang="en-US"/>
           </a:p>
@@ -4689,7 +4861,7 @@
           <a:p>
             <a:fld id="{4509A250-FF31-4206-8172-F9D3106AACB1}" type="datetimeFigureOut">
               <a:rPr lang="en-US" dirty="0"/>
-              <a:t>1/29/2018</a:t>
+              <a:t>1/31/2018</a:t>
             </a:fld>
             <a:endParaRPr lang="en-US"/>
           </a:p>
@@ -5119,7 +5291,7 @@
           <a:p>
             <a:fld id="{4509A250-FF31-4206-8172-F9D3106AACB1}" type="datetimeFigureOut">
               <a:rPr lang="en-US" dirty="0"/>
-              <a:t>1/29/2018</a:t>
+              <a:t>1/31/2018</a:t>
             </a:fld>
             <a:endParaRPr lang="en-US"/>
           </a:p>
@@ -5231,7 +5403,7 @@
           <a:p>
             <a:fld id="{4509A250-FF31-4206-8172-F9D3106AACB1}" type="datetimeFigureOut">
               <a:rPr lang="en-US" dirty="0"/>
-              <a:t>1/29/2018</a:t>
+              <a:t>1/31/2018</a:t>
             </a:fld>
             <a:endParaRPr lang="en-US"/>
           </a:p>
@@ -5321,7 +5493,7 @@
           <a:p>
             <a:fld id="{4509A250-FF31-4206-8172-F9D3106AACB1}" type="datetimeFigureOut">
               <a:rPr lang="en-US" dirty="0"/>
-              <a:t>1/29/2018</a:t>
+              <a:t>1/31/2018</a:t>
             </a:fld>
             <a:endParaRPr lang="en-US"/>
           </a:p>
@@ -5593,7 +5765,7 @@
           <a:p>
             <a:fld id="{4509A250-FF31-4206-8172-F9D3106AACB1}" type="datetimeFigureOut">
               <a:rPr lang="en-US" dirty="0"/>
-              <a:t>1/29/2018</a:t>
+              <a:t>1/31/2018</a:t>
             </a:fld>
             <a:endParaRPr lang="en-US"/>
           </a:p>
@@ -5861,7 +6033,7 @@
           <a:p>
             <a:fld id="{4509A250-FF31-4206-8172-F9D3106AACB1}" type="datetimeFigureOut">
               <a:rPr lang="en-US" dirty="0"/>
-              <a:t>1/29/2018</a:t>
+              <a:t>1/31/2018</a:t>
             </a:fld>
             <a:endParaRPr lang="en-US"/>
           </a:p>
@@ -6283,7 +6455,7 @@
           <a:p>
             <a:fld id="{4509A250-FF31-4206-8172-F9D3106AACB1}" type="datetimeFigureOut">
               <a:rPr lang="en-US" dirty="0"/>
-              <a:t>1/29/2018</a:t>
+              <a:t>1/31/2018</a:t>
             </a:fld>
             <a:endParaRPr lang="en-US"/>
           </a:p>
@@ -6844,6 +7016,89 @@
 </p:sld>
 </file>
 
+<file path=ppt/slides/slide10.xml><?xml version="1.0" encoding="utf-8"?>
+<p:sld xmlns:a="http://schemas.openxmlformats.org/drawingml/2006/main" xmlns:r="http://schemas.openxmlformats.org/officeDocument/2006/relationships" xmlns:p="http://schemas.openxmlformats.org/presentationml/2006/main">
+  <p:cSld>
+    <p:spTree>
+      <p:nvGrpSpPr>
+        <p:cNvPr id="1" name=""/>
+        <p:cNvGrpSpPr/>
+        <p:nvPr/>
+      </p:nvGrpSpPr>
+      <p:grpSpPr>
+        <a:xfrm>
+          <a:off x="0" y="0"/>
+          <a:ext cx="0" cy="0"/>
+          <a:chOff x="0" y="0"/>
+          <a:chExt cx="0" cy="0"/>
+        </a:xfrm>
+      </p:grpSpPr>
+      <p:sp>
+        <p:nvSpPr>
+          <p:cNvPr id="2" name="Title 1">
+            <a:extLst>
+              <a:ext uri="{FF2B5EF4-FFF2-40B4-BE49-F238E27FC236}">
+                <a16:creationId xmlns:a16="http://schemas.microsoft.com/office/drawing/2014/main" id="{F040837B-9695-4E92-9BC0-107FD3C7935D}"/>
+              </a:ext>
+            </a:extLst>
+          </p:cNvPr>
+          <p:cNvSpPr>
+            <a:spLocks noGrp="1"/>
+          </p:cNvSpPr>
+          <p:nvPr>
+            <p:ph type="title"/>
+          </p:nvPr>
+        </p:nvSpPr>
+        <p:spPr/>
+        <p:txBody>
+          <a:bodyPr/>
+          <a:lstStyle/>
+          <a:p>
+            <a:r>
+              <a:rPr lang="en-US"/>
+              <a:t>Questions?</a:t>
+            </a:r>
+          </a:p>
+        </p:txBody>
+      </p:sp>
+      <p:sp>
+        <p:nvSpPr>
+          <p:cNvPr id="7" name="Content Placeholder 6">
+            <a:extLst>
+              <a:ext uri="{FF2B5EF4-FFF2-40B4-BE49-F238E27FC236}">
+                <a16:creationId xmlns:a16="http://schemas.microsoft.com/office/drawing/2014/main" id="{E7995956-B25D-41ED-A157-6CF2D6E0B7A6}"/>
+              </a:ext>
+            </a:extLst>
+          </p:cNvPr>
+          <p:cNvSpPr>
+            <a:spLocks noGrp="1"/>
+          </p:cNvSpPr>
+          <p:nvPr>
+            <p:ph idx="1"/>
+          </p:nvPr>
+        </p:nvSpPr>
+        <p:spPr/>
+        <p:txBody>
+          <a:bodyPr/>
+          <a:lstStyle/>
+          <a:p>
+            <a:endParaRPr lang="en-US"/>
+          </a:p>
+        </p:txBody>
+      </p:sp>
+    </p:spTree>
+    <p:extLst>
+      <p:ext uri="{BB962C8B-B14F-4D97-AF65-F5344CB8AC3E}">
+        <p14:creationId xmlns:p14="http://schemas.microsoft.com/office/powerpoint/2010/main" val="2616159178"/>
+      </p:ext>
+    </p:extLst>
+  </p:cSld>
+  <p:clrMapOvr>
+    <a:masterClrMapping/>
+  </p:clrMapOvr>
+</p:sld>
+</file>
+
 <file path=ppt/slides/slide2.xml><?xml version="1.0" encoding="utf-8"?>
 <p:sld xmlns:a="http://schemas.openxmlformats.org/drawingml/2006/main" xmlns:r="http://schemas.openxmlformats.org/officeDocument/2006/relationships" xmlns:p="http://schemas.openxmlformats.org/presentationml/2006/main">
   <p:cSld>
@@ -7762,7 +8017,7 @@
           <p:cNvPr id="2" name="Title 1">
             <a:extLst>
               <a:ext uri="{FF2B5EF4-FFF2-40B4-BE49-F238E27FC236}">
-                <a16:creationId xmlns:a16="http://schemas.microsoft.com/office/drawing/2014/main" id="{F040837B-9695-4E92-9BC0-107FD3C7935D}"/>
+                <a16:creationId xmlns:a16="http://schemas.microsoft.com/office/drawing/2014/main" id="{12D8EE66-955A-41DA-B471-04022320552F}"/>
               </a:ext>
             </a:extLst>
           </p:cNvPr>
@@ -7779,18 +8034,18 @@
           <a:lstStyle/>
           <a:p>
             <a:r>
-              <a:rPr lang="en-US"/>
-              <a:t>Questions?</a:t>
-            </a:r>
-          </a:p>
-        </p:txBody>
-      </p:sp>
-      <p:sp>
-        <p:nvSpPr>
-          <p:cNvPr id="7" name="Content Placeholder 6">
+              <a:rPr lang="en-US" dirty="0"/>
+              <a:t>Demonstration</a:t>
+            </a:r>
+          </a:p>
+        </p:txBody>
+      </p:sp>
+      <p:sp>
+        <p:nvSpPr>
+          <p:cNvPr id="3" name="Content Placeholder 2">
             <a:extLst>
               <a:ext uri="{FF2B5EF4-FFF2-40B4-BE49-F238E27FC236}">
-                <a16:creationId xmlns:a16="http://schemas.microsoft.com/office/drawing/2014/main" id="{E7995956-B25D-41ED-A157-6CF2D6E0B7A6}"/>
+                <a16:creationId xmlns:a16="http://schemas.microsoft.com/office/drawing/2014/main" id="{84A75A31-D4D2-4504-8064-9A3434E7720A}"/>
               </a:ext>
             </a:extLst>
           </p:cNvPr>
@@ -7806,14 +8061,17 @@
           <a:bodyPr/>
           <a:lstStyle/>
           <a:p>
-            <a:endParaRPr lang="en-US"/>
+            <a:r>
+              <a:rPr lang="en-US" dirty="0"/>
+              <a:t>aptimage.net</a:t>
+            </a:r>
           </a:p>
         </p:txBody>
       </p:sp>
     </p:spTree>
     <p:extLst>
       <p:ext uri="{BB962C8B-B14F-4D97-AF65-F5344CB8AC3E}">
-        <p14:creationId xmlns:p14="http://schemas.microsoft.com/office/powerpoint/2010/main" val="2616159178"/>
+        <p14:creationId xmlns:p14="http://schemas.microsoft.com/office/powerpoint/2010/main" val="2875963669"/>
       </p:ext>
     </p:extLst>
   </p:cSld>

</xml_diff>